<commit_message>
updated solid P conc fig
</commit_message>
<xml_diff>
--- a/figures/pH_fig.pptx
+++ b/figures/pH_fig.pptx
@@ -5,8 +5,8 @@
     <p:sldMasterId id="2147483648" r:id="rId1"/>
   </p:sldMasterIdLst>
   <p:sldIdLst>
-    <p:sldId id="2371" r:id="rId2"/>
-    <p:sldId id="2372" r:id="rId3"/>
+    <p:sldId id="2372" r:id="rId2"/>
+    <p:sldId id="2371" r:id="rId3"/>
   </p:sldIdLst>
   <p:sldSz cx="12192000" cy="6858000"/>
   <p:notesSz cx="6858000" cy="9144000"/>
@@ -3341,218 +3341,6 @@
           </p:cNvPicPr>
           <p:nvPr/>
         </p:nvPicPr>
-        <p:blipFill>
-          <a:blip r:embed="rId2"/>
-          <a:stretch>
-            <a:fillRect/>
-          </a:stretch>
-        </p:blipFill>
-        <p:spPr>
-          <a:xfrm>
-            <a:off x="487331" y="1471981"/>
-            <a:ext cx="6602993" cy="3301497"/>
-          </a:xfrm>
-          <a:prstGeom prst="rect">
-            <a:avLst/>
-          </a:prstGeom>
-        </p:spPr>
-      </p:pic>
-      <p:pic>
-        <p:nvPicPr>
-          <p:cNvPr id="28" name="Picture 27">
-            <a:extLst>
-              <a:ext uri="{FF2B5EF4-FFF2-40B4-BE49-F238E27FC236}">
-                <a16:creationId xmlns:a16="http://schemas.microsoft.com/office/drawing/2014/main" id="{951BA340-EB42-3761-7EBA-EDBF2993A062}"/>
-              </a:ext>
-            </a:extLst>
-          </p:cNvPr>
-          <p:cNvPicPr>
-            <a:picLocks noChangeAspect="1"/>
-          </p:cNvPicPr>
-          <p:nvPr/>
-        </p:nvPicPr>
-        <p:blipFill>
-          <a:blip r:embed="rId3"/>
-          <a:stretch>
-            <a:fillRect/>
-          </a:stretch>
-        </p:blipFill>
-        <p:spPr>
-          <a:xfrm>
-            <a:off x="5767085" y="1471981"/>
-            <a:ext cx="6424915" cy="2780783"/>
-          </a:xfrm>
-          <a:prstGeom prst="rect">
-            <a:avLst/>
-          </a:prstGeom>
-        </p:spPr>
-      </p:pic>
-      <p:sp>
-        <p:nvSpPr>
-          <p:cNvPr id="5" name="TextBox 4">
-            <a:extLst>
-              <a:ext uri="{FF2B5EF4-FFF2-40B4-BE49-F238E27FC236}">
-                <a16:creationId xmlns:a16="http://schemas.microsoft.com/office/drawing/2014/main" id="{38A14FE5-DB15-7BCE-1C6E-7153B03E560F}"/>
-              </a:ext>
-            </a:extLst>
-          </p:cNvPr>
-          <p:cNvSpPr txBox="1"/>
-          <p:nvPr/>
-        </p:nvSpPr>
-        <p:spPr>
-          <a:xfrm>
-            <a:off x="7696815" y="1743818"/>
-            <a:ext cx="934871" cy="523220"/>
-          </a:xfrm>
-          <a:prstGeom prst="rect">
-            <a:avLst/>
-          </a:prstGeom>
-          <a:noFill/>
-        </p:spPr>
-        <p:txBody>
-          <a:bodyPr wrap="none" rtlCol="0">
-            <a:spAutoFit/>
-          </a:bodyPr>
-          <a:lstStyle/>
-          <a:p>
-            <a:r>
-              <a:rPr lang="en-US" sz="1400" dirty="0">
-                <a:latin typeface="Arial" panose="020B0604020202020204" pitchFamily="34" charset="0"/>
-                <a:cs typeface="Arial" panose="020B0604020202020204" pitchFamily="34" charset="0"/>
-              </a:rPr>
-              <a:t>p &lt; 0.001</a:t>
-            </a:r>
-          </a:p>
-          <a:p>
-            <a:r>
-              <a:rPr lang="en-US" sz="1400" dirty="0">
-                <a:latin typeface="Arial" panose="020B0604020202020204" pitchFamily="34" charset="0"/>
-                <a:cs typeface="Arial" panose="020B0604020202020204" pitchFamily="34" charset="0"/>
-              </a:rPr>
-              <a:t>R</a:t>
-            </a:r>
-            <a:r>
-              <a:rPr lang="en-US" sz="1400" baseline="30000" dirty="0">
-                <a:latin typeface="Arial" panose="020B0604020202020204" pitchFamily="34" charset="0"/>
-                <a:cs typeface="Arial" panose="020B0604020202020204" pitchFamily="34" charset="0"/>
-              </a:rPr>
-              <a:t>2 </a:t>
-            </a:r>
-            <a:r>
-              <a:rPr lang="en-US" sz="1400" dirty="0">
-                <a:latin typeface="Arial" panose="020B0604020202020204" pitchFamily="34" charset="0"/>
-                <a:cs typeface="Arial" panose="020B0604020202020204" pitchFamily="34" charset="0"/>
-              </a:rPr>
-              <a:t>= 0.45</a:t>
-            </a:r>
-          </a:p>
-        </p:txBody>
-      </p:sp>
-      <p:sp>
-        <p:nvSpPr>
-          <p:cNvPr id="6" name="TextBox 5">
-            <a:extLst>
-              <a:ext uri="{FF2B5EF4-FFF2-40B4-BE49-F238E27FC236}">
-                <a16:creationId xmlns:a16="http://schemas.microsoft.com/office/drawing/2014/main" id="{1E5544B8-F86E-C2CF-684A-C7C8795FDEE3}"/>
-              </a:ext>
-            </a:extLst>
-          </p:cNvPr>
-          <p:cNvSpPr txBox="1"/>
-          <p:nvPr/>
-        </p:nvSpPr>
-        <p:spPr>
-          <a:xfrm>
-            <a:off x="10081672" y="1743818"/>
-            <a:ext cx="934871" cy="523220"/>
-          </a:xfrm>
-          <a:prstGeom prst="rect">
-            <a:avLst/>
-          </a:prstGeom>
-          <a:noFill/>
-        </p:spPr>
-        <p:txBody>
-          <a:bodyPr wrap="none" rtlCol="0">
-            <a:spAutoFit/>
-          </a:bodyPr>
-          <a:lstStyle/>
-          <a:p>
-            <a:r>
-              <a:rPr lang="en-US" sz="1400" dirty="0">
-                <a:latin typeface="Arial" panose="020B0604020202020204" pitchFamily="34" charset="0"/>
-                <a:cs typeface="Arial" panose="020B0604020202020204" pitchFamily="34" charset="0"/>
-              </a:rPr>
-              <a:t>p &lt; 0.001</a:t>
-            </a:r>
-          </a:p>
-          <a:p>
-            <a:r>
-              <a:rPr lang="en-US" sz="1400" dirty="0">
-                <a:latin typeface="Arial" panose="020B0604020202020204" pitchFamily="34" charset="0"/>
-                <a:cs typeface="Arial" panose="020B0604020202020204" pitchFamily="34" charset="0"/>
-              </a:rPr>
-              <a:t>R</a:t>
-            </a:r>
-            <a:r>
-              <a:rPr lang="en-US" sz="1400" baseline="30000" dirty="0">
-                <a:latin typeface="Arial" panose="020B0604020202020204" pitchFamily="34" charset="0"/>
-                <a:cs typeface="Arial" panose="020B0604020202020204" pitchFamily="34" charset="0"/>
-              </a:rPr>
-              <a:t>2 </a:t>
-            </a:r>
-            <a:r>
-              <a:rPr lang="en-US" sz="1400" dirty="0">
-                <a:latin typeface="Arial" panose="020B0604020202020204" pitchFamily="34" charset="0"/>
-                <a:cs typeface="Arial" panose="020B0604020202020204" pitchFamily="34" charset="0"/>
-              </a:rPr>
-              <a:t>= 0.97</a:t>
-            </a:r>
-          </a:p>
-        </p:txBody>
-      </p:sp>
-    </p:spTree>
-    <p:extLst>
-      <p:ext uri="{BB962C8B-B14F-4D97-AF65-F5344CB8AC3E}">
-        <p14:creationId xmlns:p14="http://schemas.microsoft.com/office/powerpoint/2010/main" val="3642034611"/>
-      </p:ext>
-    </p:extLst>
-  </p:cSld>
-  <p:clrMapOvr>
-    <a:masterClrMapping/>
-  </p:clrMapOvr>
-</p:sld>
-</file>
-
-<file path=ppt/slides/slide2.xml><?xml version="1.0" encoding="utf-8"?>
-<p:sld xmlns:a="http://schemas.openxmlformats.org/drawingml/2006/main" xmlns:r="http://schemas.openxmlformats.org/officeDocument/2006/relationships" xmlns:p="http://schemas.openxmlformats.org/presentationml/2006/main">
-  <p:cSld>
-    <p:spTree>
-      <p:nvGrpSpPr>
-        <p:cNvPr id="1" name=""/>
-        <p:cNvGrpSpPr/>
-        <p:nvPr/>
-      </p:nvGrpSpPr>
-      <p:grpSpPr>
-        <a:xfrm>
-          <a:off x="0" y="0"/>
-          <a:ext cx="0" cy="0"/>
-          <a:chOff x="0" y="0"/>
-          <a:chExt cx="0" cy="0"/>
-        </a:xfrm>
-      </p:grpSpPr>
-      <p:pic>
-        <p:nvPicPr>
-          <p:cNvPr id="24" name="Picture 23">
-            <a:extLst>
-              <a:ext uri="{FF2B5EF4-FFF2-40B4-BE49-F238E27FC236}">
-                <a16:creationId xmlns:a16="http://schemas.microsoft.com/office/drawing/2014/main" id="{120F0578-6D01-D378-E77C-7F8F74A03AD8}"/>
-              </a:ext>
-            </a:extLst>
-          </p:cNvPr>
-          <p:cNvPicPr>
-            <a:picLocks noChangeAspect="1"/>
-          </p:cNvPicPr>
-          <p:nvPr/>
-        </p:nvPicPr>
         <p:blipFill rotWithShape="1">
           <a:blip r:embed="rId2"/>
           <a:srcRect r="19735"/>
@@ -3815,6 +3603,218 @@
     <p:extLst>
       <p:ext uri="{BB962C8B-B14F-4D97-AF65-F5344CB8AC3E}">
         <p14:creationId xmlns:p14="http://schemas.microsoft.com/office/powerpoint/2010/main" val="2619683642"/>
+      </p:ext>
+    </p:extLst>
+  </p:cSld>
+  <p:clrMapOvr>
+    <a:masterClrMapping/>
+  </p:clrMapOvr>
+</p:sld>
+</file>
+
+<file path=ppt/slides/slide2.xml><?xml version="1.0" encoding="utf-8"?>
+<p:sld xmlns:a="http://schemas.openxmlformats.org/drawingml/2006/main" xmlns:r="http://schemas.openxmlformats.org/officeDocument/2006/relationships" xmlns:p="http://schemas.openxmlformats.org/presentationml/2006/main">
+  <p:cSld>
+    <p:spTree>
+      <p:nvGrpSpPr>
+        <p:cNvPr id="1" name=""/>
+        <p:cNvGrpSpPr/>
+        <p:nvPr/>
+      </p:nvGrpSpPr>
+      <p:grpSpPr>
+        <a:xfrm>
+          <a:off x="0" y="0"/>
+          <a:ext cx="0" cy="0"/>
+          <a:chOff x="0" y="0"/>
+          <a:chExt cx="0" cy="0"/>
+        </a:xfrm>
+      </p:grpSpPr>
+      <p:pic>
+        <p:nvPicPr>
+          <p:cNvPr id="24" name="Picture 23">
+            <a:extLst>
+              <a:ext uri="{FF2B5EF4-FFF2-40B4-BE49-F238E27FC236}">
+                <a16:creationId xmlns:a16="http://schemas.microsoft.com/office/drawing/2014/main" id="{120F0578-6D01-D378-E77C-7F8F74A03AD8}"/>
+              </a:ext>
+            </a:extLst>
+          </p:cNvPr>
+          <p:cNvPicPr>
+            <a:picLocks noChangeAspect="1"/>
+          </p:cNvPicPr>
+          <p:nvPr/>
+        </p:nvPicPr>
+        <p:blipFill>
+          <a:blip r:embed="rId2"/>
+          <a:stretch>
+            <a:fillRect/>
+          </a:stretch>
+        </p:blipFill>
+        <p:spPr>
+          <a:xfrm>
+            <a:off x="487331" y="1471981"/>
+            <a:ext cx="6602993" cy="3301497"/>
+          </a:xfrm>
+          <a:prstGeom prst="rect">
+            <a:avLst/>
+          </a:prstGeom>
+        </p:spPr>
+      </p:pic>
+      <p:pic>
+        <p:nvPicPr>
+          <p:cNvPr id="28" name="Picture 27">
+            <a:extLst>
+              <a:ext uri="{FF2B5EF4-FFF2-40B4-BE49-F238E27FC236}">
+                <a16:creationId xmlns:a16="http://schemas.microsoft.com/office/drawing/2014/main" id="{951BA340-EB42-3761-7EBA-EDBF2993A062}"/>
+              </a:ext>
+            </a:extLst>
+          </p:cNvPr>
+          <p:cNvPicPr>
+            <a:picLocks noChangeAspect="1"/>
+          </p:cNvPicPr>
+          <p:nvPr/>
+        </p:nvPicPr>
+        <p:blipFill>
+          <a:blip r:embed="rId3"/>
+          <a:stretch>
+            <a:fillRect/>
+          </a:stretch>
+        </p:blipFill>
+        <p:spPr>
+          <a:xfrm>
+            <a:off x="5767085" y="1471981"/>
+            <a:ext cx="6424915" cy="2780783"/>
+          </a:xfrm>
+          <a:prstGeom prst="rect">
+            <a:avLst/>
+          </a:prstGeom>
+        </p:spPr>
+      </p:pic>
+      <p:sp>
+        <p:nvSpPr>
+          <p:cNvPr id="5" name="TextBox 4">
+            <a:extLst>
+              <a:ext uri="{FF2B5EF4-FFF2-40B4-BE49-F238E27FC236}">
+                <a16:creationId xmlns:a16="http://schemas.microsoft.com/office/drawing/2014/main" id="{38A14FE5-DB15-7BCE-1C6E-7153B03E560F}"/>
+              </a:ext>
+            </a:extLst>
+          </p:cNvPr>
+          <p:cNvSpPr txBox="1"/>
+          <p:nvPr/>
+        </p:nvSpPr>
+        <p:spPr>
+          <a:xfrm>
+            <a:off x="7696815" y="1743818"/>
+            <a:ext cx="934871" cy="523220"/>
+          </a:xfrm>
+          <a:prstGeom prst="rect">
+            <a:avLst/>
+          </a:prstGeom>
+          <a:noFill/>
+        </p:spPr>
+        <p:txBody>
+          <a:bodyPr wrap="none" rtlCol="0">
+            <a:spAutoFit/>
+          </a:bodyPr>
+          <a:lstStyle/>
+          <a:p>
+            <a:r>
+              <a:rPr lang="en-US" sz="1400" dirty="0">
+                <a:latin typeface="Arial" panose="020B0604020202020204" pitchFamily="34" charset="0"/>
+                <a:cs typeface="Arial" panose="020B0604020202020204" pitchFamily="34" charset="0"/>
+              </a:rPr>
+              <a:t>p &lt; 0.001</a:t>
+            </a:r>
+          </a:p>
+          <a:p>
+            <a:r>
+              <a:rPr lang="en-US" sz="1400" dirty="0">
+                <a:latin typeface="Arial" panose="020B0604020202020204" pitchFamily="34" charset="0"/>
+                <a:cs typeface="Arial" panose="020B0604020202020204" pitchFamily="34" charset="0"/>
+              </a:rPr>
+              <a:t>R</a:t>
+            </a:r>
+            <a:r>
+              <a:rPr lang="en-US" sz="1400" baseline="30000" dirty="0">
+                <a:latin typeface="Arial" panose="020B0604020202020204" pitchFamily="34" charset="0"/>
+                <a:cs typeface="Arial" panose="020B0604020202020204" pitchFamily="34" charset="0"/>
+              </a:rPr>
+              <a:t>2 </a:t>
+            </a:r>
+            <a:r>
+              <a:rPr lang="en-US" sz="1400" dirty="0">
+                <a:latin typeface="Arial" panose="020B0604020202020204" pitchFamily="34" charset="0"/>
+                <a:cs typeface="Arial" panose="020B0604020202020204" pitchFamily="34" charset="0"/>
+              </a:rPr>
+              <a:t>= 0.45</a:t>
+            </a:r>
+          </a:p>
+        </p:txBody>
+      </p:sp>
+      <p:sp>
+        <p:nvSpPr>
+          <p:cNvPr id="6" name="TextBox 5">
+            <a:extLst>
+              <a:ext uri="{FF2B5EF4-FFF2-40B4-BE49-F238E27FC236}">
+                <a16:creationId xmlns:a16="http://schemas.microsoft.com/office/drawing/2014/main" id="{1E5544B8-F86E-C2CF-684A-C7C8795FDEE3}"/>
+              </a:ext>
+            </a:extLst>
+          </p:cNvPr>
+          <p:cNvSpPr txBox="1"/>
+          <p:nvPr/>
+        </p:nvSpPr>
+        <p:spPr>
+          <a:xfrm>
+            <a:off x="10081672" y="1743818"/>
+            <a:ext cx="934871" cy="523220"/>
+          </a:xfrm>
+          <a:prstGeom prst="rect">
+            <a:avLst/>
+          </a:prstGeom>
+          <a:noFill/>
+        </p:spPr>
+        <p:txBody>
+          <a:bodyPr wrap="none" rtlCol="0">
+            <a:spAutoFit/>
+          </a:bodyPr>
+          <a:lstStyle/>
+          <a:p>
+            <a:r>
+              <a:rPr lang="en-US" sz="1400" dirty="0">
+                <a:latin typeface="Arial" panose="020B0604020202020204" pitchFamily="34" charset="0"/>
+                <a:cs typeface="Arial" panose="020B0604020202020204" pitchFamily="34" charset="0"/>
+              </a:rPr>
+              <a:t>p &lt; 0.001</a:t>
+            </a:r>
+          </a:p>
+          <a:p>
+            <a:r>
+              <a:rPr lang="en-US" sz="1400" dirty="0">
+                <a:latin typeface="Arial" panose="020B0604020202020204" pitchFamily="34" charset="0"/>
+                <a:cs typeface="Arial" panose="020B0604020202020204" pitchFamily="34" charset="0"/>
+              </a:rPr>
+              <a:t>R</a:t>
+            </a:r>
+            <a:r>
+              <a:rPr lang="en-US" sz="1400" baseline="30000" dirty="0">
+                <a:latin typeface="Arial" panose="020B0604020202020204" pitchFamily="34" charset="0"/>
+                <a:cs typeface="Arial" panose="020B0604020202020204" pitchFamily="34" charset="0"/>
+              </a:rPr>
+              <a:t>2 </a:t>
+            </a:r>
+            <a:r>
+              <a:rPr lang="en-US" sz="1400" dirty="0">
+                <a:latin typeface="Arial" panose="020B0604020202020204" pitchFamily="34" charset="0"/>
+                <a:cs typeface="Arial" panose="020B0604020202020204" pitchFamily="34" charset="0"/>
+              </a:rPr>
+              <a:t>= 0.97</a:t>
+            </a:r>
+          </a:p>
+        </p:txBody>
+      </p:sp>
+    </p:spTree>
+    <p:extLst>
+      <p:ext uri="{BB962C8B-B14F-4D97-AF65-F5344CB8AC3E}">
+        <p14:creationId xmlns:p14="http://schemas.microsoft.com/office/powerpoint/2010/main" val="3642034611"/>
       </p:ext>
     </p:extLst>
   </p:cSld>

</xml_diff>

<commit_message>
merged the 2 manuscript related scripts together. this is the script for the final submitted manuscript
</commit_message>
<xml_diff>
--- a/figures/pH_fig.pptx
+++ b/figures/pH_fig.pptx
@@ -260,7 +260,7 @@
           <a:p>
             <a:fld id="{8622E48A-49B3-0140-92F9-2F4EF2F3D1BF}" type="datetimeFigureOut">
               <a:rPr lang="en-US" smtClean="0"/>
-              <a:t>7/4/24</a:t>
+              <a:t>7/12/24</a:t>
             </a:fld>
             <a:endParaRPr lang="en-US"/>
           </a:p>
@@ -458,7 +458,7 @@
           <a:p>
             <a:fld id="{8622E48A-49B3-0140-92F9-2F4EF2F3D1BF}" type="datetimeFigureOut">
               <a:rPr lang="en-US" smtClean="0"/>
-              <a:t>7/4/24</a:t>
+              <a:t>7/12/24</a:t>
             </a:fld>
             <a:endParaRPr lang="en-US"/>
           </a:p>
@@ -666,7 +666,7 @@
           <a:p>
             <a:fld id="{8622E48A-49B3-0140-92F9-2F4EF2F3D1BF}" type="datetimeFigureOut">
               <a:rPr lang="en-US" smtClean="0"/>
-              <a:t>7/4/24</a:t>
+              <a:t>7/12/24</a:t>
             </a:fld>
             <a:endParaRPr lang="en-US"/>
           </a:p>
@@ -864,7 +864,7 @@
           <a:p>
             <a:fld id="{8622E48A-49B3-0140-92F9-2F4EF2F3D1BF}" type="datetimeFigureOut">
               <a:rPr lang="en-US" smtClean="0"/>
-              <a:t>7/4/24</a:t>
+              <a:t>7/12/24</a:t>
             </a:fld>
             <a:endParaRPr lang="en-US"/>
           </a:p>
@@ -1139,7 +1139,7 @@
           <a:p>
             <a:fld id="{8622E48A-49B3-0140-92F9-2F4EF2F3D1BF}" type="datetimeFigureOut">
               <a:rPr lang="en-US" smtClean="0"/>
-              <a:t>7/4/24</a:t>
+              <a:t>7/12/24</a:t>
             </a:fld>
             <a:endParaRPr lang="en-US"/>
           </a:p>
@@ -1404,7 +1404,7 @@
           <a:p>
             <a:fld id="{8622E48A-49B3-0140-92F9-2F4EF2F3D1BF}" type="datetimeFigureOut">
               <a:rPr lang="en-US" smtClean="0"/>
-              <a:t>7/4/24</a:t>
+              <a:t>7/12/24</a:t>
             </a:fld>
             <a:endParaRPr lang="en-US"/>
           </a:p>
@@ -1816,7 +1816,7 @@
           <a:p>
             <a:fld id="{8622E48A-49B3-0140-92F9-2F4EF2F3D1BF}" type="datetimeFigureOut">
               <a:rPr lang="en-US" smtClean="0"/>
-              <a:t>7/4/24</a:t>
+              <a:t>7/12/24</a:t>
             </a:fld>
             <a:endParaRPr lang="en-US"/>
           </a:p>
@@ -1957,7 +1957,7 @@
           <a:p>
             <a:fld id="{8622E48A-49B3-0140-92F9-2F4EF2F3D1BF}" type="datetimeFigureOut">
               <a:rPr lang="en-US" smtClean="0"/>
-              <a:t>7/4/24</a:t>
+              <a:t>7/12/24</a:t>
             </a:fld>
             <a:endParaRPr lang="en-US"/>
           </a:p>
@@ -2070,7 +2070,7 @@
           <a:p>
             <a:fld id="{8622E48A-49B3-0140-92F9-2F4EF2F3D1BF}" type="datetimeFigureOut">
               <a:rPr lang="en-US" smtClean="0"/>
-              <a:t>7/4/24</a:t>
+              <a:t>7/12/24</a:t>
             </a:fld>
             <a:endParaRPr lang="en-US"/>
           </a:p>
@@ -2381,7 +2381,7 @@
           <a:p>
             <a:fld id="{8622E48A-49B3-0140-92F9-2F4EF2F3D1BF}" type="datetimeFigureOut">
               <a:rPr lang="en-US" smtClean="0"/>
-              <a:t>7/4/24</a:t>
+              <a:t>7/12/24</a:t>
             </a:fld>
             <a:endParaRPr lang="en-US"/>
           </a:p>
@@ -2669,7 +2669,7 @@
           <a:p>
             <a:fld id="{8622E48A-49B3-0140-92F9-2F4EF2F3D1BF}" type="datetimeFigureOut">
               <a:rPr lang="en-US" smtClean="0"/>
-              <a:t>7/4/24</a:t>
+              <a:t>7/12/24</a:t>
             </a:fld>
             <a:endParaRPr lang="en-US"/>
           </a:p>
@@ -2910,7 +2910,7 @@
           <a:p>
             <a:fld id="{8622E48A-49B3-0140-92F9-2F4EF2F3D1BF}" type="datetimeFigureOut">
               <a:rPr lang="en-US" smtClean="0"/>
-              <a:t>7/4/24</a:t>
+              <a:t>7/12/24</a:t>
             </a:fld>
             <a:endParaRPr lang="en-US"/>
           </a:p>
@@ -3544,7 +3544,7 @@
         <p:spPr>
           <a:xfrm>
             <a:off x="2425549" y="311229"/>
-            <a:ext cx="441146" cy="369332"/>
+            <a:ext cx="375424" cy="369332"/>
           </a:xfrm>
           <a:prstGeom prst="rect">
             <a:avLst/>
@@ -3559,7 +3559,7 @@
           <a:p>
             <a:r>
               <a:rPr lang="en-US" dirty="0"/>
-              <a:t>a.)</a:t>
+              <a:t>a)</a:t>
             </a:r>
           </a:p>
         </p:txBody>
@@ -3579,7 +3579,7 @@
         <p:spPr>
           <a:xfrm>
             <a:off x="2426125" y="3176404"/>
-            <a:ext cx="440570" cy="369332"/>
+            <a:ext cx="381836" cy="369332"/>
           </a:xfrm>
           <a:prstGeom prst="rect">
             <a:avLst/>
@@ -3594,7 +3594,7 @@
           <a:p>
             <a:r>
               <a:rPr lang="en-US" dirty="0"/>
-              <a:t>b.)</a:t>
+              <a:t>b)</a:t>
             </a:r>
           </a:p>
         </p:txBody>

</xml_diff>